<commit_message>
- lecture 2.1 content update
</commit_message>
<xml_diff>
--- a/lectures/week2/lecture2/slides/week2_lecture2.pptx
+++ b/lectures/week2/lecture2/slides/week2_lecture2.pptx
@@ -2128,7 +2128,7 @@
         <p:spPr>
           <a:xfrm>
             <a:off x="335947" y="5102715"/>
-            <a:ext cx="4736168" cy="1600438"/>
+            <a:ext cx="4736168" cy="1323439"/>
           </a:xfrm>
           <a:prstGeom prst="rect">
             <a:avLst/>
@@ -2254,41 +2254,29 @@
                   <a:srgbClr val="66FF99"/>
                 </a:solidFill>
               </a:rPr>
-              <a:t>Tutorial and Practical sessions running all week</a:t>
-            </a:r>
-            <a:r>
-              <a:rPr lang="en-US" sz="1600" dirty="0">
+              <a:t>Tutorial and Practical sessions running all </a:t>
+            </a:r>
+            <a:r>
+              <a:rPr lang="en-US" sz="1600">
+                <a:solidFill>
+                  <a:srgbClr val="66FF99"/>
+                </a:solidFill>
+              </a:rPr>
+              <a:t>week</a:t>
+            </a:r>
+            <a:r>
+              <a:rPr lang="en-US" sz="1600">
                 <a:solidFill>
                   <a:srgbClr val="CC99FF"/>
                 </a:solidFill>
               </a:rPr>
               <a:t>.</a:t>
             </a:r>
-          </a:p>
-          <a:p>
-            <a:pPr marL="285750" indent="-285750">
-              <a:buClr>
+            <a:endParaRPr lang="en-US" sz="1600" dirty="0">
+              <a:solidFill>
                 <a:srgbClr val="CC99FF"/>
-              </a:buClr>
-              <a:buFont typeface="Wingdings" panose="05000000000000000000" pitchFamily="2" charset="2"/>
-              <a:buChar char="§"/>
-            </a:pPr>
-            <a:r>
-              <a:rPr lang="en-US" sz="1600" dirty="0">
-                <a:solidFill>
-                  <a:srgbClr val="66FF99"/>
-                </a:solidFill>
-              </a:rPr>
-              <a:t>TUT0104 Recording posted on OCCS</a:t>
-            </a:r>
-            <a:r>
-              <a:rPr lang="en-US" sz="1600" dirty="0">
-                <a:solidFill>
-                  <a:srgbClr val="CC99FF"/>
-                </a:solidFill>
-              </a:rPr>
-              <a:t>.</a:t>
-            </a:r>
+              </a:solidFill>
+            </a:endParaRPr>
           </a:p>
         </p:txBody>
       </p:sp>

</xml_diff>